<commit_message>
update image, add test JNI
</commit_message>
<xml_diff>
--- a/Docs/Present porttype.pptx
+++ b/Docs/Present porttype.pptx
@@ -6,6 +6,13 @@
   </p:sldMasterIdLst>
   <p:sldIdLst>
     <p:sldId id="256" r:id="rId2"/>
+    <p:sldId id="257" r:id="rId3"/>
+    <p:sldId id="258" r:id="rId4"/>
+    <p:sldId id="259" r:id="rId5"/>
+    <p:sldId id="260" r:id="rId6"/>
+    <p:sldId id="261" r:id="rId7"/>
+    <p:sldId id="262" r:id="rId8"/>
+    <p:sldId id="263" r:id="rId9"/>
   </p:sldIdLst>
   <p:sldSz cx="12192000" cy="6858000"/>
   <p:notesSz cx="6858000" cy="9144000"/>
@@ -104,6 +111,11 @@
       </a:defRPr>
     </a:lvl9pPr>
   </p:defaultTextStyle>
+  <p:extLst>
+    <p:ext uri="{EFAFB233-063F-42B5-8137-9DF3F51BA10A}">
+      <p15:sldGuideLst xmlns:p15="http://schemas.microsoft.com/office/powerpoint/2012/main"/>
+    </p:ext>
+  </p:extLst>
 </p:presentation>
 </file>
 
@@ -256,7 +268,7 @@
           <a:p>
             <a:fld id="{BBDC90E0-3B83-4F9D-9106-EE8FBB4AC785}" type="datetimeFigureOut">
               <a:rPr lang="en-US" smtClean="0"/>
-              <a:t>3/9/2020</a:t>
+              <a:t>3/11/2020</a:t>
             </a:fld>
             <a:endParaRPr lang="en-US"/>
           </a:p>
@@ -456,7 +468,7 @@
           <a:p>
             <a:fld id="{BBDC90E0-3B83-4F9D-9106-EE8FBB4AC785}" type="datetimeFigureOut">
               <a:rPr lang="en-US" smtClean="0"/>
-              <a:t>3/9/2020</a:t>
+              <a:t>3/11/2020</a:t>
             </a:fld>
             <a:endParaRPr lang="en-US"/>
           </a:p>
@@ -666,7 +678,7 @@
           <a:p>
             <a:fld id="{BBDC90E0-3B83-4F9D-9106-EE8FBB4AC785}" type="datetimeFigureOut">
               <a:rPr lang="en-US" smtClean="0"/>
-              <a:t>3/9/2020</a:t>
+              <a:t>3/11/2020</a:t>
             </a:fld>
             <a:endParaRPr lang="en-US"/>
           </a:p>
@@ -866,7 +878,7 @@
           <a:p>
             <a:fld id="{BBDC90E0-3B83-4F9D-9106-EE8FBB4AC785}" type="datetimeFigureOut">
               <a:rPr lang="en-US" smtClean="0"/>
-              <a:t>3/9/2020</a:t>
+              <a:t>3/11/2020</a:t>
             </a:fld>
             <a:endParaRPr lang="en-US"/>
           </a:p>
@@ -1142,7 +1154,7 @@
           <a:p>
             <a:fld id="{BBDC90E0-3B83-4F9D-9106-EE8FBB4AC785}" type="datetimeFigureOut">
               <a:rPr lang="en-US" smtClean="0"/>
-              <a:t>3/9/2020</a:t>
+              <a:t>3/11/2020</a:t>
             </a:fld>
             <a:endParaRPr lang="en-US"/>
           </a:p>
@@ -1410,7 +1422,7 @@
           <a:p>
             <a:fld id="{BBDC90E0-3B83-4F9D-9106-EE8FBB4AC785}" type="datetimeFigureOut">
               <a:rPr lang="en-US" smtClean="0"/>
-              <a:t>3/9/2020</a:t>
+              <a:t>3/11/2020</a:t>
             </a:fld>
             <a:endParaRPr lang="en-US"/>
           </a:p>
@@ -1825,7 +1837,7 @@
           <a:p>
             <a:fld id="{BBDC90E0-3B83-4F9D-9106-EE8FBB4AC785}" type="datetimeFigureOut">
               <a:rPr lang="en-US" smtClean="0"/>
-              <a:t>3/9/2020</a:t>
+              <a:t>3/11/2020</a:t>
             </a:fld>
             <a:endParaRPr lang="en-US"/>
           </a:p>
@@ -1967,7 +1979,7 @@
           <a:p>
             <a:fld id="{BBDC90E0-3B83-4F9D-9106-EE8FBB4AC785}" type="datetimeFigureOut">
               <a:rPr lang="en-US" smtClean="0"/>
-              <a:t>3/9/2020</a:t>
+              <a:t>3/11/2020</a:t>
             </a:fld>
             <a:endParaRPr lang="en-US"/>
           </a:p>
@@ -2080,7 +2092,7 @@
           <a:p>
             <a:fld id="{BBDC90E0-3B83-4F9D-9106-EE8FBB4AC785}" type="datetimeFigureOut">
               <a:rPr lang="en-US" smtClean="0"/>
-              <a:t>3/9/2020</a:t>
+              <a:t>3/11/2020</a:t>
             </a:fld>
             <a:endParaRPr lang="en-US"/>
           </a:p>
@@ -2393,7 +2405,7 @@
           <a:p>
             <a:fld id="{BBDC90E0-3B83-4F9D-9106-EE8FBB4AC785}" type="datetimeFigureOut">
               <a:rPr lang="en-US" smtClean="0"/>
-              <a:t>3/9/2020</a:t>
+              <a:t>3/11/2020</a:t>
             </a:fld>
             <a:endParaRPr lang="en-US"/>
           </a:p>
@@ -2682,7 +2694,7 @@
           <a:p>
             <a:fld id="{BBDC90E0-3B83-4F9D-9106-EE8FBB4AC785}" type="datetimeFigureOut">
               <a:rPr lang="en-US" smtClean="0"/>
-              <a:t>3/9/2020</a:t>
+              <a:t>3/11/2020</a:t>
             </a:fld>
             <a:endParaRPr lang="en-US"/>
           </a:p>
@@ -2925,7 +2937,7 @@
           <a:p>
             <a:fld id="{BBDC90E0-3B83-4F9D-9106-EE8FBB4AC785}" type="datetimeFigureOut">
               <a:rPr lang="en-US" smtClean="0"/>
-              <a:t>3/9/2020</a:t>
+              <a:t>3/11/2020</a:t>
             </a:fld>
             <a:endParaRPr lang="en-US"/>
           </a:p>
@@ -3363,7 +3375,18 @@
           <a:bodyPr/>
           <a:lstStyle/>
           <a:p>
-            <a:endParaRPr lang="en-US"/>
+            <a:r>
+              <a:rPr lang="en-US" altLang="zh-CN" dirty="0"/>
+              <a:t>Auto-self-adjusted provision</a:t>
+            </a:r>
+            <a:br>
+              <a:rPr lang="en-US" altLang="zh-CN" dirty="0"/>
+            </a:br>
+            <a:r>
+              <a:rPr lang="en-US" altLang="zh-CN" dirty="0"/>
+              <a:t>at resource level</a:t>
+            </a:r>
+            <a:endParaRPr lang="en-US" dirty="0"/>
           </a:p>
         </p:txBody>
       </p:sp>
@@ -3388,7 +3411,35 @@
           <a:bodyPr/>
           <a:lstStyle/>
           <a:p>
-            <a:endParaRPr lang="en-US"/>
+            <a:r>
+              <a:rPr lang="en-US" altLang="zh-CN" dirty="0"/>
+              <a:t>Proposal </a:t>
+            </a:r>
+          </a:p>
+          <a:p>
+            <a:r>
+              <a:rPr lang="en-US" altLang="zh-CN" dirty="0"/>
+              <a:t>Present at 11</a:t>
+            </a:r>
+            <a:r>
+              <a:rPr lang="en-US" altLang="zh-CN" baseline="30000" dirty="0"/>
+              <a:t>th</a:t>
+            </a:r>
+            <a:r>
+              <a:rPr lang="en-US" altLang="zh-CN" dirty="0"/>
+              <a:t> of March</a:t>
+            </a:r>
+          </a:p>
+          <a:p>
+            <a:r>
+              <a:rPr lang="en-US" dirty="0"/>
+              <a:t>Y</a:t>
+            </a:r>
+            <a:r>
+              <a:rPr lang="en-US" altLang="zh-CN" dirty="0"/>
+              <a:t>ou Hu</a:t>
+            </a:r>
+            <a:endParaRPr lang="en-US" dirty="0"/>
           </a:p>
         </p:txBody>
       </p:sp>
@@ -3396,6 +3447,1983 @@
     <p:extLst>
       <p:ext uri="{BB962C8B-B14F-4D97-AF65-F5344CB8AC3E}">
         <p14:creationId xmlns:p14="http://schemas.microsoft.com/office/powerpoint/2010/main" val="2690396683"/>
+      </p:ext>
+    </p:extLst>
+  </p:cSld>
+  <p:clrMapOvr>
+    <a:masterClrMapping/>
+  </p:clrMapOvr>
+</p:sld>
+</file>
+
+<file path=ppt/slides/slide2.xml><?xml version="1.0" encoding="utf-8"?>
+<p:sld xmlns:a="http://schemas.openxmlformats.org/drawingml/2006/main" xmlns:r="http://schemas.openxmlformats.org/officeDocument/2006/relationships" xmlns:p="http://schemas.openxmlformats.org/presentationml/2006/main">
+  <p:cSld>
+    <p:spTree>
+      <p:nvGrpSpPr>
+        <p:cNvPr id="1" name=""/>
+        <p:cNvGrpSpPr/>
+        <p:nvPr/>
+      </p:nvGrpSpPr>
+      <p:grpSpPr>
+        <a:xfrm>
+          <a:off x="0" y="0"/>
+          <a:ext cx="0" cy="0"/>
+          <a:chOff x="0" y="0"/>
+          <a:chExt cx="0" cy="0"/>
+        </a:xfrm>
+      </p:grpSpPr>
+      <p:sp>
+        <p:nvSpPr>
+          <p:cNvPr id="2" name="标题 1">
+            <a:extLst>
+              <a:ext uri="{FF2B5EF4-FFF2-40B4-BE49-F238E27FC236}">
+                <a16:creationId xmlns:a16="http://schemas.microsoft.com/office/drawing/2014/main" id="{292A3599-2915-4928-BC15-60F58BF3A329}"/>
+              </a:ext>
+            </a:extLst>
+          </p:cNvPr>
+          <p:cNvSpPr>
+            <a:spLocks noGrp="1"/>
+          </p:cNvSpPr>
+          <p:nvPr>
+            <p:ph type="title"/>
+          </p:nvPr>
+        </p:nvSpPr>
+        <p:spPr/>
+        <p:txBody>
+          <a:bodyPr/>
+          <a:lstStyle/>
+          <a:p>
+            <a:r>
+              <a:rPr lang="en-US" b="1" dirty="0" err="1"/>
+              <a:t>SAGECal</a:t>
+            </a:r>
+            <a:endParaRPr lang="en-US" dirty="0"/>
+          </a:p>
+        </p:txBody>
+      </p:sp>
+      <p:sp>
+        <p:nvSpPr>
+          <p:cNvPr id="4" name="矩形 3">
+            <a:extLst>
+              <a:ext uri="{FF2B5EF4-FFF2-40B4-BE49-F238E27FC236}">
+                <a16:creationId xmlns:a16="http://schemas.microsoft.com/office/drawing/2014/main" id="{F5CF938F-AB8C-432C-9B65-E7F19B08A591}"/>
+              </a:ext>
+            </a:extLst>
+          </p:cNvPr>
+          <p:cNvSpPr/>
+          <p:nvPr/>
+        </p:nvSpPr>
+        <p:spPr>
+          <a:xfrm>
+            <a:off x="2982898" y="2876366"/>
+            <a:ext cx="5699464" cy="1775534"/>
+          </a:xfrm>
+          <a:prstGeom prst="rect">
+            <a:avLst/>
+          </a:prstGeom>
+          <a:solidFill>
+            <a:schemeClr val="bg2">
+              <a:lumMod val="50000"/>
+            </a:schemeClr>
+          </a:solidFill>
+        </p:spPr>
+        <p:style>
+          <a:lnRef idx="2">
+            <a:schemeClr val="accent1">
+              <a:shade val="50000"/>
+            </a:schemeClr>
+          </a:lnRef>
+          <a:fillRef idx="1">
+            <a:schemeClr val="accent1"/>
+          </a:fillRef>
+          <a:effectRef idx="0">
+            <a:schemeClr val="accent1"/>
+          </a:effectRef>
+          <a:fontRef idx="minor">
+            <a:schemeClr val="lt1"/>
+          </a:fontRef>
+        </p:style>
+        <p:txBody>
+          <a:bodyPr rtlCol="0" anchor="ctr"/>
+          <a:lstStyle/>
+          <a:p>
+            <a:pPr algn="ctr"/>
+            <a:r>
+              <a:rPr lang="en-US" dirty="0" err="1"/>
+              <a:t>SAGEC</a:t>
+            </a:r>
+            <a:r>
+              <a:rPr lang="en-US" altLang="zh-CN" dirty="0" err="1"/>
+              <a:t>al</a:t>
+            </a:r>
+            <a:endParaRPr lang="en-US" dirty="0"/>
+          </a:p>
+        </p:txBody>
+      </p:sp>
+      <p:sp>
+        <p:nvSpPr>
+          <p:cNvPr id="5" name="箭头: 右 4">
+            <a:extLst>
+              <a:ext uri="{FF2B5EF4-FFF2-40B4-BE49-F238E27FC236}">
+                <a16:creationId xmlns:a16="http://schemas.microsoft.com/office/drawing/2014/main" id="{F9A3C33D-230E-4630-A297-3A2CCCE9599D}"/>
+              </a:ext>
+            </a:extLst>
+          </p:cNvPr>
+          <p:cNvSpPr/>
+          <p:nvPr/>
+        </p:nvSpPr>
+        <p:spPr>
+          <a:xfrm>
+            <a:off x="949911" y="3630967"/>
+            <a:ext cx="1766656" cy="301841"/>
+          </a:xfrm>
+          <a:prstGeom prst="rightArrow">
+            <a:avLst/>
+          </a:prstGeom>
+          <a:solidFill>
+            <a:schemeClr val="bg1">
+              <a:lumMod val="75000"/>
+            </a:schemeClr>
+          </a:solidFill>
+        </p:spPr>
+        <p:style>
+          <a:lnRef idx="2">
+            <a:schemeClr val="accent1">
+              <a:shade val="50000"/>
+            </a:schemeClr>
+          </a:lnRef>
+          <a:fillRef idx="1">
+            <a:schemeClr val="accent1"/>
+          </a:fillRef>
+          <a:effectRef idx="0">
+            <a:schemeClr val="accent1"/>
+          </a:effectRef>
+          <a:fontRef idx="minor">
+            <a:schemeClr val="lt1"/>
+          </a:fontRef>
+        </p:style>
+        <p:txBody>
+          <a:bodyPr rtlCol="0" anchor="ctr"/>
+          <a:lstStyle/>
+          <a:p>
+            <a:pPr algn="ctr"/>
+            <a:endParaRPr lang="en-US"/>
+          </a:p>
+        </p:txBody>
+      </p:sp>
+      <p:sp>
+        <p:nvSpPr>
+          <p:cNvPr id="6" name="箭头: 右 5">
+            <a:extLst>
+              <a:ext uri="{FF2B5EF4-FFF2-40B4-BE49-F238E27FC236}">
+                <a16:creationId xmlns:a16="http://schemas.microsoft.com/office/drawing/2014/main" id="{C14CD844-D29B-453C-BB6D-F92776CEF17F}"/>
+              </a:ext>
+            </a:extLst>
+          </p:cNvPr>
+          <p:cNvSpPr/>
+          <p:nvPr/>
+        </p:nvSpPr>
+        <p:spPr>
+          <a:xfrm>
+            <a:off x="9385178" y="3613212"/>
+            <a:ext cx="1766656" cy="301841"/>
+          </a:xfrm>
+          <a:prstGeom prst="rightArrow">
+            <a:avLst/>
+          </a:prstGeom>
+          <a:solidFill>
+            <a:schemeClr val="bg1">
+              <a:lumMod val="75000"/>
+            </a:schemeClr>
+          </a:solidFill>
+        </p:spPr>
+        <p:style>
+          <a:lnRef idx="2">
+            <a:schemeClr val="accent1">
+              <a:shade val="50000"/>
+            </a:schemeClr>
+          </a:lnRef>
+          <a:fillRef idx="1">
+            <a:schemeClr val="accent1"/>
+          </a:fillRef>
+          <a:effectRef idx="0">
+            <a:schemeClr val="accent1"/>
+          </a:effectRef>
+          <a:fontRef idx="minor">
+            <a:schemeClr val="lt1"/>
+          </a:fontRef>
+        </p:style>
+        <p:txBody>
+          <a:bodyPr rtlCol="0" anchor="ctr"/>
+          <a:lstStyle/>
+          <a:p>
+            <a:pPr algn="ctr"/>
+            <a:endParaRPr lang="en-US"/>
+          </a:p>
+        </p:txBody>
+      </p:sp>
+      <p:sp>
+        <p:nvSpPr>
+          <p:cNvPr id="7" name="箭头: 右 6">
+            <a:extLst>
+              <a:ext uri="{FF2B5EF4-FFF2-40B4-BE49-F238E27FC236}">
+                <a16:creationId xmlns:a16="http://schemas.microsoft.com/office/drawing/2014/main" id="{8483DDED-E683-4784-B4D9-3A768C9B1006}"/>
+              </a:ext>
+            </a:extLst>
+          </p:cNvPr>
+          <p:cNvSpPr/>
+          <p:nvPr/>
+        </p:nvSpPr>
+        <p:spPr>
+          <a:xfrm rot="16200000">
+            <a:off x="5005527" y="5763425"/>
+            <a:ext cx="1766656" cy="301841"/>
+          </a:xfrm>
+          <a:prstGeom prst="rightArrow">
+            <a:avLst/>
+          </a:prstGeom>
+          <a:solidFill>
+            <a:schemeClr val="bg1">
+              <a:lumMod val="75000"/>
+            </a:schemeClr>
+          </a:solidFill>
+        </p:spPr>
+        <p:style>
+          <a:lnRef idx="2">
+            <a:schemeClr val="accent1">
+              <a:shade val="50000"/>
+            </a:schemeClr>
+          </a:lnRef>
+          <a:fillRef idx="1">
+            <a:schemeClr val="accent1"/>
+          </a:fillRef>
+          <a:effectRef idx="0">
+            <a:schemeClr val="accent1"/>
+          </a:effectRef>
+          <a:fontRef idx="minor">
+            <a:schemeClr val="lt1"/>
+          </a:fontRef>
+        </p:style>
+        <p:txBody>
+          <a:bodyPr rtlCol="0" anchor="ctr"/>
+          <a:lstStyle/>
+          <a:p>
+            <a:pPr algn="ctr"/>
+            <a:endParaRPr lang="en-US"/>
+          </a:p>
+        </p:txBody>
+      </p:sp>
+      <p:sp>
+        <p:nvSpPr>
+          <p:cNvPr id="8" name="文本框 7">
+            <a:extLst>
+              <a:ext uri="{FF2B5EF4-FFF2-40B4-BE49-F238E27FC236}">
+                <a16:creationId xmlns:a16="http://schemas.microsoft.com/office/drawing/2014/main" id="{8360D268-6B60-4554-AE18-0B39AA77607F}"/>
+              </a:ext>
+            </a:extLst>
+          </p:cNvPr>
+          <p:cNvSpPr txBox="1"/>
+          <p:nvPr/>
+        </p:nvSpPr>
+        <p:spPr>
+          <a:xfrm>
+            <a:off x="838200" y="3227033"/>
+            <a:ext cx="2086254" cy="369332"/>
+          </a:xfrm>
+          <a:prstGeom prst="rect">
+            <a:avLst/>
+          </a:prstGeom>
+          <a:noFill/>
+        </p:spPr>
+        <p:txBody>
+          <a:bodyPr wrap="square" rtlCol="0">
+            <a:spAutoFit/>
+          </a:bodyPr>
+          <a:lstStyle/>
+          <a:p>
+            <a:r>
+              <a:rPr lang="en-US" altLang="zh-CN" dirty="0"/>
+              <a:t>Pre-processed data</a:t>
+            </a:r>
+            <a:endParaRPr lang="en-US" dirty="0"/>
+          </a:p>
+        </p:txBody>
+      </p:sp>
+      <p:sp>
+        <p:nvSpPr>
+          <p:cNvPr id="9" name="文本框 8">
+            <a:extLst>
+              <a:ext uri="{FF2B5EF4-FFF2-40B4-BE49-F238E27FC236}">
+                <a16:creationId xmlns:a16="http://schemas.microsoft.com/office/drawing/2014/main" id="{B0154732-B6EB-40BC-9FC4-AAE5404BC809}"/>
+              </a:ext>
+            </a:extLst>
+          </p:cNvPr>
+          <p:cNvSpPr txBox="1"/>
+          <p:nvPr/>
+        </p:nvSpPr>
+        <p:spPr>
+          <a:xfrm>
+            <a:off x="6096000" y="5468645"/>
+            <a:ext cx="1893903" cy="368933"/>
+          </a:xfrm>
+          <a:prstGeom prst="rect">
+            <a:avLst/>
+          </a:prstGeom>
+          <a:noFill/>
+        </p:spPr>
+        <p:txBody>
+          <a:bodyPr wrap="square" rtlCol="0">
+            <a:spAutoFit/>
+          </a:bodyPr>
+          <a:lstStyle/>
+          <a:p>
+            <a:r>
+              <a:rPr lang="en-US" altLang="zh-CN" dirty="0"/>
+              <a:t>Fixed sky model</a:t>
+            </a:r>
+            <a:endParaRPr lang="en-US" dirty="0"/>
+          </a:p>
+        </p:txBody>
+      </p:sp>
+      <p:sp>
+        <p:nvSpPr>
+          <p:cNvPr id="10" name="矩形 9">
+            <a:extLst>
+              <a:ext uri="{FF2B5EF4-FFF2-40B4-BE49-F238E27FC236}">
+                <a16:creationId xmlns:a16="http://schemas.microsoft.com/office/drawing/2014/main" id="{27DA4179-712C-4286-8E55-29905CEE76A3}"/>
+              </a:ext>
+            </a:extLst>
+          </p:cNvPr>
+          <p:cNvSpPr/>
+          <p:nvPr/>
+        </p:nvSpPr>
+        <p:spPr>
+          <a:xfrm>
+            <a:off x="3135298" y="3028766"/>
+            <a:ext cx="5699464" cy="1775534"/>
+          </a:xfrm>
+          <a:prstGeom prst="rect">
+            <a:avLst/>
+          </a:prstGeom>
+          <a:solidFill>
+            <a:schemeClr val="bg2">
+              <a:lumMod val="50000"/>
+            </a:schemeClr>
+          </a:solidFill>
+        </p:spPr>
+        <p:style>
+          <a:lnRef idx="2">
+            <a:schemeClr val="accent1">
+              <a:shade val="50000"/>
+            </a:schemeClr>
+          </a:lnRef>
+          <a:fillRef idx="1">
+            <a:schemeClr val="accent1"/>
+          </a:fillRef>
+          <a:effectRef idx="0">
+            <a:schemeClr val="accent1"/>
+          </a:effectRef>
+          <a:fontRef idx="minor">
+            <a:schemeClr val="lt1"/>
+          </a:fontRef>
+        </p:style>
+        <p:txBody>
+          <a:bodyPr rtlCol="0" anchor="ctr"/>
+          <a:lstStyle/>
+          <a:p>
+            <a:pPr algn="ctr"/>
+            <a:r>
+              <a:rPr lang="en-US" dirty="0" err="1"/>
+              <a:t>SAGEC</a:t>
+            </a:r>
+            <a:r>
+              <a:rPr lang="en-US" altLang="zh-CN" dirty="0" err="1"/>
+              <a:t>al</a:t>
+            </a:r>
+            <a:endParaRPr lang="en-US" dirty="0"/>
+          </a:p>
+        </p:txBody>
+      </p:sp>
+      <p:sp>
+        <p:nvSpPr>
+          <p:cNvPr id="11" name="矩形 10">
+            <a:extLst>
+              <a:ext uri="{FF2B5EF4-FFF2-40B4-BE49-F238E27FC236}">
+                <a16:creationId xmlns:a16="http://schemas.microsoft.com/office/drawing/2014/main" id="{B7EA07A4-4BDB-4778-89BC-502E22B50403}"/>
+              </a:ext>
+            </a:extLst>
+          </p:cNvPr>
+          <p:cNvSpPr/>
+          <p:nvPr/>
+        </p:nvSpPr>
+        <p:spPr>
+          <a:xfrm>
+            <a:off x="3287698" y="3181166"/>
+            <a:ext cx="5699464" cy="1775534"/>
+          </a:xfrm>
+          <a:prstGeom prst="rect">
+            <a:avLst/>
+          </a:prstGeom>
+          <a:solidFill>
+            <a:schemeClr val="bg2">
+              <a:lumMod val="50000"/>
+            </a:schemeClr>
+          </a:solidFill>
+        </p:spPr>
+        <p:style>
+          <a:lnRef idx="2">
+            <a:schemeClr val="accent1">
+              <a:shade val="50000"/>
+            </a:schemeClr>
+          </a:lnRef>
+          <a:fillRef idx="1">
+            <a:schemeClr val="accent1"/>
+          </a:fillRef>
+          <a:effectRef idx="0">
+            <a:schemeClr val="accent1"/>
+          </a:effectRef>
+          <a:fontRef idx="minor">
+            <a:schemeClr val="lt1"/>
+          </a:fontRef>
+        </p:style>
+        <p:txBody>
+          <a:bodyPr rtlCol="0" anchor="ctr"/>
+          <a:lstStyle/>
+          <a:p>
+            <a:pPr algn="ctr"/>
+            <a:r>
+              <a:rPr lang="en-US" dirty="0" err="1"/>
+              <a:t>SAGEC</a:t>
+            </a:r>
+            <a:r>
+              <a:rPr lang="en-US" altLang="zh-CN" dirty="0" err="1"/>
+              <a:t>al</a:t>
+            </a:r>
+            <a:endParaRPr lang="en-US" dirty="0"/>
+          </a:p>
+        </p:txBody>
+      </p:sp>
+      <p:sp>
+        <p:nvSpPr>
+          <p:cNvPr id="13" name="文本框 12">
+            <a:extLst>
+              <a:ext uri="{FF2B5EF4-FFF2-40B4-BE49-F238E27FC236}">
+                <a16:creationId xmlns:a16="http://schemas.microsoft.com/office/drawing/2014/main" id="{7475E0B2-E3A1-487D-8946-3537D97122F2}"/>
+              </a:ext>
+            </a:extLst>
+          </p:cNvPr>
+          <p:cNvSpPr txBox="1"/>
+          <p:nvPr/>
+        </p:nvSpPr>
+        <p:spPr>
+          <a:xfrm>
+            <a:off x="9570128" y="3227033"/>
+            <a:ext cx="1393794" cy="369332"/>
+          </a:xfrm>
+          <a:prstGeom prst="rect">
+            <a:avLst/>
+          </a:prstGeom>
+          <a:noFill/>
+        </p:spPr>
+        <p:txBody>
+          <a:bodyPr wrap="square" rtlCol="0">
+            <a:spAutoFit/>
+          </a:bodyPr>
+          <a:lstStyle/>
+          <a:p>
+            <a:r>
+              <a:rPr lang="en-US" altLang="zh-CN" dirty="0"/>
+              <a:t>Results</a:t>
+            </a:r>
+            <a:endParaRPr lang="en-US" dirty="0"/>
+          </a:p>
+        </p:txBody>
+      </p:sp>
+      <p:sp>
+        <p:nvSpPr>
+          <p:cNvPr id="14" name="文本框 13">
+            <a:extLst>
+              <a:ext uri="{FF2B5EF4-FFF2-40B4-BE49-F238E27FC236}">
+                <a16:creationId xmlns:a16="http://schemas.microsoft.com/office/drawing/2014/main" id="{0AE3FC71-CB0B-4F8C-B84F-AB172DA7A12D}"/>
+              </a:ext>
+            </a:extLst>
+          </p:cNvPr>
+          <p:cNvSpPr txBox="1"/>
+          <p:nvPr/>
+        </p:nvSpPr>
+        <p:spPr>
+          <a:xfrm>
+            <a:off x="6800297" y="3885398"/>
+            <a:ext cx="2432481" cy="369332"/>
+          </a:xfrm>
+          <a:prstGeom prst="rect">
+            <a:avLst/>
+          </a:prstGeom>
+          <a:noFill/>
+        </p:spPr>
+        <p:txBody>
+          <a:bodyPr wrap="square" rtlCol="0">
+            <a:spAutoFit/>
+          </a:bodyPr>
+          <a:lstStyle/>
+          <a:p>
+            <a:r>
+              <a:rPr lang="en-US" altLang="zh-CN" dirty="0"/>
+              <a:t>Excon?</a:t>
+            </a:r>
+            <a:endParaRPr lang="en-US" dirty="0"/>
+          </a:p>
+        </p:txBody>
+      </p:sp>
+    </p:spTree>
+    <p:extLst>
+      <p:ext uri="{BB962C8B-B14F-4D97-AF65-F5344CB8AC3E}">
+        <p14:creationId xmlns:p14="http://schemas.microsoft.com/office/powerpoint/2010/main" val="2949011881"/>
+      </p:ext>
+    </p:extLst>
+  </p:cSld>
+  <p:clrMapOvr>
+    <a:masterClrMapping/>
+  </p:clrMapOvr>
+</p:sld>
+</file>
+
+<file path=ppt/slides/slide3.xml><?xml version="1.0" encoding="utf-8"?>
+<p:sld xmlns:a="http://schemas.openxmlformats.org/drawingml/2006/main" xmlns:r="http://schemas.openxmlformats.org/officeDocument/2006/relationships" xmlns:p="http://schemas.openxmlformats.org/presentationml/2006/main">
+  <p:cSld>
+    <p:spTree>
+      <p:nvGrpSpPr>
+        <p:cNvPr id="1" name=""/>
+        <p:cNvGrpSpPr/>
+        <p:nvPr/>
+      </p:nvGrpSpPr>
+      <p:grpSpPr>
+        <a:xfrm>
+          <a:off x="0" y="0"/>
+          <a:ext cx="0" cy="0"/>
+          <a:chOff x="0" y="0"/>
+          <a:chExt cx="0" cy="0"/>
+        </a:xfrm>
+      </p:grpSpPr>
+      <p:sp>
+        <p:nvSpPr>
+          <p:cNvPr id="2" name="标题 1">
+            <a:extLst>
+              <a:ext uri="{FF2B5EF4-FFF2-40B4-BE49-F238E27FC236}">
+                <a16:creationId xmlns:a16="http://schemas.microsoft.com/office/drawing/2014/main" id="{296F2E6F-B172-445B-9C07-DF9FC27DA87A}"/>
+              </a:ext>
+            </a:extLst>
+          </p:cNvPr>
+          <p:cNvSpPr>
+            <a:spLocks noGrp="1"/>
+          </p:cNvSpPr>
+          <p:nvPr>
+            <p:ph type="title"/>
+          </p:nvPr>
+        </p:nvSpPr>
+        <p:spPr/>
+        <p:txBody>
+          <a:bodyPr/>
+          <a:lstStyle/>
+          <a:p>
+            <a:r>
+              <a:rPr lang="en-US" dirty="0"/>
+              <a:t>Issues of MPI and Spark </a:t>
+            </a:r>
+          </a:p>
+        </p:txBody>
+      </p:sp>
+      <p:pic>
+        <p:nvPicPr>
+          <p:cNvPr id="7" name="图片 6" descr="图片包含 游戏机&#10;&#10;描述已自动生成">
+            <a:extLst>
+              <a:ext uri="{FF2B5EF4-FFF2-40B4-BE49-F238E27FC236}">
+                <a16:creationId xmlns:a16="http://schemas.microsoft.com/office/drawing/2014/main" id="{D13F18A9-4EB7-4137-AE4D-69EF7EBDDD0E}"/>
+              </a:ext>
+            </a:extLst>
+          </p:cNvPr>
+          <p:cNvPicPr>
+            <a:picLocks noChangeAspect="1"/>
+          </p:cNvPicPr>
+          <p:nvPr/>
+        </p:nvPicPr>
+        <p:blipFill>
+          <a:blip r:embed="rId2">
+            <a:extLst>
+              <a:ext uri="{28A0092B-C50C-407E-A947-70E740481C1C}">
+                <a14:useLocalDpi xmlns:a14="http://schemas.microsoft.com/office/drawing/2010/main" val="0"/>
+              </a:ext>
+            </a:extLst>
+          </a:blip>
+          <a:stretch>
+            <a:fillRect/>
+          </a:stretch>
+        </p:blipFill>
+        <p:spPr>
+          <a:xfrm>
+            <a:off x="665000" y="2224380"/>
+            <a:ext cx="4629150" cy="3409950"/>
+          </a:xfrm>
+          <a:prstGeom prst="rect">
+            <a:avLst/>
+          </a:prstGeom>
+        </p:spPr>
+      </p:pic>
+      <p:pic>
+        <p:nvPicPr>
+          <p:cNvPr id="9" name="图片 8" descr="图片包含 游戏机&#10;&#10;描述已自动生成">
+            <a:extLst>
+              <a:ext uri="{FF2B5EF4-FFF2-40B4-BE49-F238E27FC236}">
+                <a16:creationId xmlns:a16="http://schemas.microsoft.com/office/drawing/2014/main" id="{2F854ED8-B52F-48FE-AE0C-766BC3994180}"/>
+              </a:ext>
+            </a:extLst>
+          </p:cNvPr>
+          <p:cNvPicPr>
+            <a:picLocks noChangeAspect="1"/>
+          </p:cNvPicPr>
+          <p:nvPr/>
+        </p:nvPicPr>
+        <p:blipFill>
+          <a:blip r:embed="rId3">
+            <a:extLst>
+              <a:ext uri="{28A0092B-C50C-407E-A947-70E740481C1C}">
+                <a14:useLocalDpi xmlns:a14="http://schemas.microsoft.com/office/drawing/2010/main" val="0"/>
+              </a:ext>
+            </a:extLst>
+          </a:blip>
+          <a:stretch>
+            <a:fillRect/>
+          </a:stretch>
+        </p:blipFill>
+        <p:spPr>
+          <a:xfrm>
+            <a:off x="6564862" y="2351509"/>
+            <a:ext cx="4343400" cy="3295650"/>
+          </a:xfrm>
+          <a:prstGeom prst="rect">
+            <a:avLst/>
+          </a:prstGeom>
+        </p:spPr>
+      </p:pic>
+      <p:sp>
+        <p:nvSpPr>
+          <p:cNvPr id="10" name="文本框 9">
+            <a:extLst>
+              <a:ext uri="{FF2B5EF4-FFF2-40B4-BE49-F238E27FC236}">
+                <a16:creationId xmlns:a16="http://schemas.microsoft.com/office/drawing/2014/main" id="{AFCF83EA-8F9D-44F8-8BC9-2D9E16C06CC2}"/>
+              </a:ext>
+            </a:extLst>
+          </p:cNvPr>
+          <p:cNvSpPr txBox="1"/>
+          <p:nvPr/>
+        </p:nvSpPr>
+        <p:spPr>
+          <a:xfrm>
+            <a:off x="838200" y="5876339"/>
+            <a:ext cx="5617029" cy="369332"/>
+          </a:xfrm>
+          <a:prstGeom prst="rect">
+            <a:avLst/>
+          </a:prstGeom>
+          <a:noFill/>
+        </p:spPr>
+        <p:txBody>
+          <a:bodyPr wrap="square" rtlCol="0">
+            <a:spAutoFit/>
+          </a:bodyPr>
+          <a:lstStyle/>
+          <a:p>
+            <a:r>
+              <a:rPr lang="en-US" dirty="0"/>
+              <a:t>The resources can not be utilized </a:t>
+            </a:r>
+            <a:r>
+              <a:rPr lang="en-US" altLang="zh-CN" dirty="0"/>
+              <a:t>completely</a:t>
+            </a:r>
+            <a:endParaRPr lang="en-US" dirty="0"/>
+          </a:p>
+        </p:txBody>
+      </p:sp>
+    </p:spTree>
+    <p:extLst>
+      <p:ext uri="{BB962C8B-B14F-4D97-AF65-F5344CB8AC3E}">
+        <p14:creationId xmlns:p14="http://schemas.microsoft.com/office/powerpoint/2010/main" val="1005904226"/>
+      </p:ext>
+    </p:extLst>
+  </p:cSld>
+  <p:clrMapOvr>
+    <a:masterClrMapping/>
+  </p:clrMapOvr>
+</p:sld>
+</file>
+
+<file path=ppt/slides/slide4.xml><?xml version="1.0" encoding="utf-8"?>
+<p:sld xmlns:a="http://schemas.openxmlformats.org/drawingml/2006/main" xmlns:r="http://schemas.openxmlformats.org/officeDocument/2006/relationships" xmlns:p="http://schemas.openxmlformats.org/presentationml/2006/main">
+  <p:cSld>
+    <p:spTree>
+      <p:nvGrpSpPr>
+        <p:cNvPr id="1" name=""/>
+        <p:cNvGrpSpPr/>
+        <p:nvPr/>
+      </p:nvGrpSpPr>
+      <p:grpSpPr>
+        <a:xfrm>
+          <a:off x="0" y="0"/>
+          <a:ext cx="0" cy="0"/>
+          <a:chOff x="0" y="0"/>
+          <a:chExt cx="0" cy="0"/>
+        </a:xfrm>
+      </p:grpSpPr>
+      <p:sp>
+        <p:nvSpPr>
+          <p:cNvPr id="2" name="标题 1">
+            <a:extLst>
+              <a:ext uri="{FF2B5EF4-FFF2-40B4-BE49-F238E27FC236}">
+                <a16:creationId xmlns:a16="http://schemas.microsoft.com/office/drawing/2014/main" id="{4C660A5F-4A78-40A4-890F-CAE81B096F2D}"/>
+              </a:ext>
+            </a:extLst>
+          </p:cNvPr>
+          <p:cNvSpPr>
+            <a:spLocks noGrp="1"/>
+          </p:cNvSpPr>
+          <p:nvPr>
+            <p:ph type="title"/>
+          </p:nvPr>
+        </p:nvSpPr>
+        <p:spPr/>
+        <p:txBody>
+          <a:bodyPr/>
+          <a:lstStyle/>
+          <a:p>
+            <a:r>
+              <a:rPr lang="en-US" dirty="0"/>
+              <a:t>Possible solution?</a:t>
+            </a:r>
+          </a:p>
+        </p:txBody>
+      </p:sp>
+      <p:sp>
+        <p:nvSpPr>
+          <p:cNvPr id="3" name="内容占位符 2">
+            <a:extLst>
+              <a:ext uri="{FF2B5EF4-FFF2-40B4-BE49-F238E27FC236}">
+                <a16:creationId xmlns:a16="http://schemas.microsoft.com/office/drawing/2014/main" id="{AED94203-E759-402B-8D17-179A342A0F89}"/>
+              </a:ext>
+            </a:extLst>
+          </p:cNvPr>
+          <p:cNvSpPr>
+            <a:spLocks noGrp="1"/>
+          </p:cNvSpPr>
+          <p:nvPr>
+            <p:ph idx="1"/>
+          </p:nvPr>
+        </p:nvSpPr>
+        <p:spPr/>
+        <p:txBody>
+          <a:bodyPr/>
+          <a:lstStyle/>
+          <a:p>
+            <a:r>
+              <a:rPr lang="en-US" dirty="0"/>
+              <a:t>MPI:</a:t>
+            </a:r>
+          </a:p>
+          <a:p>
+            <a:pPr lvl="1"/>
+            <a:r>
+              <a:rPr lang="en-US" dirty="0"/>
+              <a:t>Smart job queue managed by cluster</a:t>
+            </a:r>
+          </a:p>
+          <a:p>
+            <a:pPr lvl="1"/>
+            <a:r>
+              <a:rPr lang="en-US" dirty="0"/>
+              <a:t>Finer or uniformed granularity</a:t>
+            </a:r>
+          </a:p>
+          <a:p>
+            <a:r>
+              <a:rPr lang="en-US" dirty="0"/>
+              <a:t>Spark </a:t>
+            </a:r>
+          </a:p>
+          <a:p>
+            <a:pPr lvl="1"/>
+            <a:r>
+              <a:rPr lang="en-US" dirty="0"/>
+              <a:t>Containerization (current solution)</a:t>
+            </a:r>
+          </a:p>
+          <a:p>
+            <a:pPr lvl="1"/>
+            <a:r>
+              <a:rPr lang="en-US" dirty="0"/>
+              <a:t>Buy Databricks auto-scaling solution</a:t>
+            </a:r>
+          </a:p>
+          <a:p>
+            <a:r>
+              <a:rPr lang="en-US" dirty="0"/>
+              <a:t>Other solution?</a:t>
+            </a:r>
+          </a:p>
+          <a:p>
+            <a:pPr lvl="1"/>
+            <a:r>
+              <a:rPr lang="en-US" altLang="zh-CN" dirty="0"/>
+              <a:t>Kubernetes</a:t>
+            </a:r>
+          </a:p>
+          <a:p>
+            <a:pPr lvl="1"/>
+            <a:r>
+              <a:rPr lang="en-US" dirty="0"/>
+              <a:t>VM</a:t>
+            </a:r>
+            <a:r>
+              <a:rPr lang="en-US" altLang="zh-CN" dirty="0"/>
+              <a:t>s</a:t>
+            </a:r>
+            <a:endParaRPr lang="en-US" dirty="0"/>
+          </a:p>
+          <a:p>
+            <a:pPr marL="457200" lvl="1" indent="0">
+              <a:buNone/>
+            </a:pPr>
+            <a:endParaRPr lang="en-US" dirty="0"/>
+          </a:p>
+        </p:txBody>
+      </p:sp>
+      <p:pic>
+        <p:nvPicPr>
+          <p:cNvPr id="4" name="图片 3">
+            <a:extLst>
+              <a:ext uri="{FF2B5EF4-FFF2-40B4-BE49-F238E27FC236}">
+                <a16:creationId xmlns:a16="http://schemas.microsoft.com/office/drawing/2014/main" id="{F0E8B1B0-53DC-4743-9A32-5F2CFF954101}"/>
+              </a:ext>
+            </a:extLst>
+          </p:cNvPr>
+          <p:cNvPicPr>
+            <a:picLocks noChangeAspect="1"/>
+          </p:cNvPicPr>
+          <p:nvPr/>
+        </p:nvPicPr>
+        <p:blipFill>
+          <a:blip r:embed="rId2"/>
+          <a:stretch>
+            <a:fillRect/>
+          </a:stretch>
+        </p:blipFill>
+        <p:spPr>
+          <a:xfrm>
+            <a:off x="6887702" y="4942937"/>
+            <a:ext cx="5690473" cy="1915063"/>
+          </a:xfrm>
+          <a:prstGeom prst="rect">
+            <a:avLst/>
+          </a:prstGeom>
+        </p:spPr>
+      </p:pic>
+    </p:spTree>
+    <p:extLst>
+      <p:ext uri="{BB962C8B-B14F-4D97-AF65-F5344CB8AC3E}">
+        <p14:creationId xmlns:p14="http://schemas.microsoft.com/office/powerpoint/2010/main" val="2108279265"/>
+      </p:ext>
+    </p:extLst>
+  </p:cSld>
+  <p:clrMapOvr>
+    <a:masterClrMapping/>
+  </p:clrMapOvr>
+</p:sld>
+</file>
+
+<file path=ppt/slides/slide5.xml><?xml version="1.0" encoding="utf-8"?>
+<p:sld xmlns:a="http://schemas.openxmlformats.org/drawingml/2006/main" xmlns:r="http://schemas.openxmlformats.org/officeDocument/2006/relationships" xmlns:p="http://schemas.openxmlformats.org/presentationml/2006/main">
+  <p:cSld>
+    <p:spTree>
+      <p:nvGrpSpPr>
+        <p:cNvPr id="1" name=""/>
+        <p:cNvGrpSpPr/>
+        <p:nvPr/>
+      </p:nvGrpSpPr>
+      <p:grpSpPr>
+        <a:xfrm>
+          <a:off x="0" y="0"/>
+          <a:ext cx="0" cy="0"/>
+          <a:chOff x="0" y="0"/>
+          <a:chExt cx="0" cy="0"/>
+        </a:xfrm>
+      </p:grpSpPr>
+      <p:sp>
+        <p:nvSpPr>
+          <p:cNvPr id="2" name="标题 1">
+            <a:extLst>
+              <a:ext uri="{FF2B5EF4-FFF2-40B4-BE49-F238E27FC236}">
+                <a16:creationId xmlns:a16="http://schemas.microsoft.com/office/drawing/2014/main" id="{342E9E13-A98D-48C5-A501-88C5CDCC8127}"/>
+              </a:ext>
+            </a:extLst>
+          </p:cNvPr>
+          <p:cNvSpPr>
+            <a:spLocks noGrp="1"/>
+          </p:cNvSpPr>
+          <p:nvPr>
+            <p:ph type="title"/>
+          </p:nvPr>
+        </p:nvSpPr>
+        <p:spPr/>
+        <p:txBody>
+          <a:bodyPr/>
+          <a:lstStyle/>
+          <a:p>
+            <a:r>
+              <a:rPr lang="en-US" dirty="0"/>
+              <a:t>Overview design</a:t>
+            </a:r>
+          </a:p>
+        </p:txBody>
+      </p:sp>
+      <p:pic>
+        <p:nvPicPr>
+          <p:cNvPr id="5" name="内容占位符 4" descr="手机屏幕的截图&#10;&#10;描述已自动生成">
+            <a:extLst>
+              <a:ext uri="{FF2B5EF4-FFF2-40B4-BE49-F238E27FC236}">
+                <a16:creationId xmlns:a16="http://schemas.microsoft.com/office/drawing/2014/main" id="{D675C09B-E24D-4FEF-8BC6-BFE969A37A55}"/>
+              </a:ext>
+            </a:extLst>
+          </p:cNvPr>
+          <p:cNvPicPr>
+            <a:picLocks noGrp="1" noChangeAspect="1"/>
+          </p:cNvPicPr>
+          <p:nvPr>
+            <p:ph idx="1"/>
+          </p:nvPr>
+        </p:nvPicPr>
+        <p:blipFill>
+          <a:blip r:embed="rId2">
+            <a:extLst>
+              <a:ext uri="{28A0092B-C50C-407E-A947-70E740481C1C}">
+                <a14:useLocalDpi xmlns:a14="http://schemas.microsoft.com/office/drawing/2010/main" val="0"/>
+              </a:ext>
+            </a:extLst>
+          </a:blip>
+          <a:stretch>
+            <a:fillRect/>
+          </a:stretch>
+        </p:blipFill>
+        <p:spPr>
+          <a:xfrm>
+            <a:off x="3911619" y="715917"/>
+            <a:ext cx="7852341" cy="5776958"/>
+          </a:xfrm>
+        </p:spPr>
+      </p:pic>
+      <p:sp>
+        <p:nvSpPr>
+          <p:cNvPr id="6" name="文本框 5">
+            <a:extLst>
+              <a:ext uri="{FF2B5EF4-FFF2-40B4-BE49-F238E27FC236}">
+                <a16:creationId xmlns:a16="http://schemas.microsoft.com/office/drawing/2014/main" id="{D3E61179-9713-4AC7-9F75-67E94F38D79A}"/>
+              </a:ext>
+            </a:extLst>
+          </p:cNvPr>
+          <p:cNvSpPr txBox="1"/>
+          <p:nvPr/>
+        </p:nvSpPr>
+        <p:spPr>
+          <a:xfrm>
+            <a:off x="603682" y="1935332"/>
+            <a:ext cx="3116062" cy="1200329"/>
+          </a:xfrm>
+          <a:prstGeom prst="rect">
+            <a:avLst/>
+          </a:prstGeom>
+          <a:noFill/>
+        </p:spPr>
+        <p:txBody>
+          <a:bodyPr wrap="square" rtlCol="0">
+            <a:spAutoFit/>
+          </a:bodyPr>
+          <a:lstStyle/>
+          <a:p>
+            <a:r>
+              <a:rPr lang="en-US" altLang="zh-CN" dirty="0"/>
+              <a:t>Tackle on THREE dimensions</a:t>
+            </a:r>
+          </a:p>
+          <a:p>
+            <a:pPr marL="285750" indent="-285750">
+              <a:buFont typeface="Arial" panose="020B0604020202020204" pitchFamily="34" charset="0"/>
+              <a:buChar char="•"/>
+            </a:pPr>
+            <a:r>
+              <a:rPr lang="en-US" altLang="zh-CN" dirty="0"/>
+              <a:t>Self-adjusted provisioning</a:t>
+            </a:r>
+          </a:p>
+          <a:p>
+            <a:pPr marL="285750" indent="-285750">
+              <a:buFont typeface="Arial" panose="020B0604020202020204" pitchFamily="34" charset="0"/>
+              <a:buChar char="•"/>
+            </a:pPr>
+            <a:r>
+              <a:rPr lang="en-US" altLang="zh-CN" dirty="0"/>
+              <a:t>Cross region</a:t>
+            </a:r>
+          </a:p>
+          <a:p>
+            <a:pPr marL="285750" indent="-285750">
+              <a:buFont typeface="Arial" panose="020B0604020202020204" pitchFamily="34" charset="0"/>
+              <a:buChar char="•"/>
+            </a:pPr>
+            <a:r>
+              <a:rPr lang="en-US" altLang="zh-CN" dirty="0"/>
+              <a:t>Data locality</a:t>
+            </a:r>
+            <a:endParaRPr lang="en-US" dirty="0"/>
+          </a:p>
+        </p:txBody>
+      </p:sp>
+    </p:spTree>
+    <p:extLst>
+      <p:ext uri="{BB962C8B-B14F-4D97-AF65-F5344CB8AC3E}">
+        <p14:creationId xmlns:p14="http://schemas.microsoft.com/office/powerpoint/2010/main" val="541886802"/>
+      </p:ext>
+    </p:extLst>
+  </p:cSld>
+  <p:clrMapOvr>
+    <a:masterClrMapping/>
+  </p:clrMapOvr>
+</p:sld>
+</file>
+
+<file path=ppt/slides/slide6.xml><?xml version="1.0" encoding="utf-8"?>
+<p:sld xmlns:a="http://schemas.openxmlformats.org/drawingml/2006/main" xmlns:r="http://schemas.openxmlformats.org/officeDocument/2006/relationships" xmlns:p="http://schemas.openxmlformats.org/presentationml/2006/main">
+  <p:cSld>
+    <p:spTree>
+      <p:nvGrpSpPr>
+        <p:cNvPr id="1" name=""/>
+        <p:cNvGrpSpPr/>
+        <p:nvPr/>
+      </p:nvGrpSpPr>
+      <p:grpSpPr>
+        <a:xfrm>
+          <a:off x="0" y="0"/>
+          <a:ext cx="0" cy="0"/>
+          <a:chOff x="0" y="0"/>
+          <a:chExt cx="0" cy="0"/>
+        </a:xfrm>
+      </p:grpSpPr>
+      <p:sp>
+        <p:nvSpPr>
+          <p:cNvPr id="13" name="矩形: 圆角 12">
+            <a:extLst>
+              <a:ext uri="{FF2B5EF4-FFF2-40B4-BE49-F238E27FC236}">
+                <a16:creationId xmlns:a16="http://schemas.microsoft.com/office/drawing/2014/main" id="{078E93F5-60FD-4E82-87D7-008F617DB77D}"/>
+              </a:ext>
+            </a:extLst>
+          </p:cNvPr>
+          <p:cNvSpPr/>
+          <p:nvPr/>
+        </p:nvSpPr>
+        <p:spPr>
+          <a:xfrm>
+            <a:off x="4230209" y="2342148"/>
+            <a:ext cx="4656339" cy="2361442"/>
+          </a:xfrm>
+          <a:prstGeom prst="roundRect">
+            <a:avLst/>
+          </a:prstGeom>
+          <a:solidFill>
+            <a:schemeClr val="accent6">
+              <a:lumMod val="40000"/>
+              <a:lumOff val="60000"/>
+            </a:schemeClr>
+          </a:solidFill>
+        </p:spPr>
+        <p:style>
+          <a:lnRef idx="2">
+            <a:schemeClr val="accent1">
+              <a:shade val="50000"/>
+            </a:schemeClr>
+          </a:lnRef>
+          <a:fillRef idx="1">
+            <a:schemeClr val="accent1"/>
+          </a:fillRef>
+          <a:effectRef idx="0">
+            <a:schemeClr val="accent1"/>
+          </a:effectRef>
+          <a:fontRef idx="minor">
+            <a:schemeClr val="lt1"/>
+          </a:fontRef>
+        </p:style>
+        <p:txBody>
+          <a:bodyPr rtlCol="0" anchor="ctr"/>
+          <a:lstStyle/>
+          <a:p>
+            <a:pPr algn="ctr"/>
+            <a:endParaRPr lang="en-US" dirty="0"/>
+          </a:p>
+        </p:txBody>
+      </p:sp>
+      <p:sp>
+        <p:nvSpPr>
+          <p:cNvPr id="2" name="标题 1">
+            <a:extLst>
+              <a:ext uri="{FF2B5EF4-FFF2-40B4-BE49-F238E27FC236}">
+                <a16:creationId xmlns:a16="http://schemas.microsoft.com/office/drawing/2014/main" id="{6AA8DA94-E26E-4B79-B452-3EA15EDB6425}"/>
+              </a:ext>
+            </a:extLst>
+          </p:cNvPr>
+          <p:cNvSpPr>
+            <a:spLocks noGrp="1"/>
+          </p:cNvSpPr>
+          <p:nvPr>
+            <p:ph type="title"/>
+          </p:nvPr>
+        </p:nvSpPr>
+        <p:spPr/>
+        <p:txBody>
+          <a:bodyPr/>
+          <a:lstStyle/>
+          <a:p>
+            <a:r>
+              <a:rPr lang="en-US" altLang="zh-CN" dirty="0"/>
+              <a:t>Self-adjusted provisioning</a:t>
+            </a:r>
+            <a:endParaRPr lang="en-US" dirty="0"/>
+          </a:p>
+        </p:txBody>
+      </p:sp>
+      <p:sp>
+        <p:nvSpPr>
+          <p:cNvPr id="4" name="矩形: 圆角 3">
+            <a:extLst>
+              <a:ext uri="{FF2B5EF4-FFF2-40B4-BE49-F238E27FC236}">
+                <a16:creationId xmlns:a16="http://schemas.microsoft.com/office/drawing/2014/main" id="{D79A3A66-F286-49AD-885B-4160F72BEAEC}"/>
+              </a:ext>
+            </a:extLst>
+          </p:cNvPr>
+          <p:cNvSpPr/>
+          <p:nvPr/>
+        </p:nvSpPr>
+        <p:spPr>
+          <a:xfrm>
+            <a:off x="4323425" y="2592279"/>
+            <a:ext cx="2254928" cy="1145219"/>
+          </a:xfrm>
+          <a:prstGeom prst="roundRect">
+            <a:avLst/>
+          </a:prstGeom>
+          <a:solidFill>
+            <a:schemeClr val="bg2">
+              <a:lumMod val="50000"/>
+            </a:schemeClr>
+          </a:solidFill>
+        </p:spPr>
+        <p:style>
+          <a:lnRef idx="2">
+            <a:schemeClr val="accent1">
+              <a:shade val="50000"/>
+            </a:schemeClr>
+          </a:lnRef>
+          <a:fillRef idx="1">
+            <a:schemeClr val="accent1"/>
+          </a:fillRef>
+          <a:effectRef idx="0">
+            <a:schemeClr val="accent1"/>
+          </a:effectRef>
+          <a:fontRef idx="minor">
+            <a:schemeClr val="lt1"/>
+          </a:fontRef>
+        </p:style>
+        <p:txBody>
+          <a:bodyPr rtlCol="0" anchor="ctr"/>
+          <a:lstStyle/>
+          <a:p>
+            <a:pPr algn="ctr"/>
+            <a:r>
+              <a:rPr lang="en-US" altLang="zh-CN" dirty="0"/>
+              <a:t>Master</a:t>
+            </a:r>
+            <a:endParaRPr lang="en-US" dirty="0"/>
+          </a:p>
+        </p:txBody>
+      </p:sp>
+      <p:sp>
+        <p:nvSpPr>
+          <p:cNvPr id="5" name="矩形 4">
+            <a:extLst>
+              <a:ext uri="{FF2B5EF4-FFF2-40B4-BE49-F238E27FC236}">
+                <a16:creationId xmlns:a16="http://schemas.microsoft.com/office/drawing/2014/main" id="{5469B63B-B3FF-4BEA-A988-6FF097B239FF}"/>
+              </a:ext>
+            </a:extLst>
+          </p:cNvPr>
+          <p:cNvSpPr/>
+          <p:nvPr/>
+        </p:nvSpPr>
+        <p:spPr>
+          <a:xfrm>
+            <a:off x="213064" y="2743198"/>
+            <a:ext cx="1882066" cy="843379"/>
+          </a:xfrm>
+          <a:prstGeom prst="rect">
+            <a:avLst/>
+          </a:prstGeom>
+          <a:solidFill>
+            <a:schemeClr val="accent2">
+              <a:lumMod val="60000"/>
+              <a:lumOff val="40000"/>
+            </a:schemeClr>
+          </a:solidFill>
+          <a:ln>
+            <a:solidFill>
+              <a:schemeClr val="accent2">
+                <a:lumMod val="60000"/>
+                <a:lumOff val="40000"/>
+              </a:schemeClr>
+            </a:solidFill>
+          </a:ln>
+        </p:spPr>
+        <p:style>
+          <a:lnRef idx="2">
+            <a:schemeClr val="accent1">
+              <a:shade val="50000"/>
+            </a:schemeClr>
+          </a:lnRef>
+          <a:fillRef idx="1">
+            <a:schemeClr val="accent1"/>
+          </a:fillRef>
+          <a:effectRef idx="0">
+            <a:schemeClr val="accent1"/>
+          </a:effectRef>
+          <a:fontRef idx="minor">
+            <a:schemeClr val="lt1"/>
+          </a:fontRef>
+        </p:style>
+        <p:txBody>
+          <a:bodyPr rtlCol="0" anchor="ctr"/>
+          <a:lstStyle/>
+          <a:p>
+            <a:pPr algn="ctr"/>
+            <a:r>
+              <a:rPr lang="en-US" altLang="zh-CN" dirty="0"/>
+              <a:t>Server</a:t>
+            </a:r>
+            <a:endParaRPr lang="en-US" dirty="0"/>
+          </a:p>
+        </p:txBody>
+      </p:sp>
+      <p:cxnSp>
+        <p:nvCxnSpPr>
+          <p:cNvPr id="7" name="直接箭头连接符 6">
+            <a:extLst>
+              <a:ext uri="{FF2B5EF4-FFF2-40B4-BE49-F238E27FC236}">
+                <a16:creationId xmlns:a16="http://schemas.microsoft.com/office/drawing/2014/main" id="{1D32F43E-BBC2-41FD-B304-CF063E63C68E}"/>
+              </a:ext>
+            </a:extLst>
+          </p:cNvPr>
+          <p:cNvCxnSpPr/>
+          <p:nvPr/>
+        </p:nvCxnSpPr>
+        <p:spPr>
+          <a:xfrm>
+            <a:off x="2396971" y="2996212"/>
+            <a:ext cx="1722267" cy="0"/>
+          </a:xfrm>
+          <a:prstGeom prst="straightConnector1">
+            <a:avLst/>
+          </a:prstGeom>
+          <a:ln>
+            <a:tailEnd type="triangle"/>
+          </a:ln>
+        </p:spPr>
+        <p:style>
+          <a:lnRef idx="1">
+            <a:schemeClr val="accent1"/>
+          </a:lnRef>
+          <a:fillRef idx="0">
+            <a:schemeClr val="accent1"/>
+          </a:fillRef>
+          <a:effectRef idx="0">
+            <a:schemeClr val="accent1"/>
+          </a:effectRef>
+          <a:fontRef idx="minor">
+            <a:schemeClr val="tx1"/>
+          </a:fontRef>
+        </p:style>
+      </p:cxnSp>
+      <p:sp>
+        <p:nvSpPr>
+          <p:cNvPr id="8" name="文本框 7">
+            <a:extLst>
+              <a:ext uri="{FF2B5EF4-FFF2-40B4-BE49-F238E27FC236}">
+                <a16:creationId xmlns:a16="http://schemas.microsoft.com/office/drawing/2014/main" id="{65F55E57-9359-4BD0-BEFF-CD6CD2C3FDF7}"/>
+              </a:ext>
+            </a:extLst>
+          </p:cNvPr>
+          <p:cNvSpPr txBox="1"/>
+          <p:nvPr/>
+        </p:nvSpPr>
+        <p:spPr>
+          <a:xfrm>
+            <a:off x="2299317" y="1552322"/>
+            <a:ext cx="2991775" cy="1477328"/>
+          </a:xfrm>
+          <a:prstGeom prst="rect">
+            <a:avLst/>
+          </a:prstGeom>
+          <a:noFill/>
+        </p:spPr>
+        <p:txBody>
+          <a:bodyPr wrap="square" rtlCol="0">
+            <a:spAutoFit/>
+          </a:bodyPr>
+          <a:lstStyle/>
+          <a:p>
+            <a:r>
+              <a:rPr lang="en-US" altLang="zh-CN" dirty="0"/>
+              <a:t>{job queue:[8,16,16,12,2,32],</a:t>
+            </a:r>
+          </a:p>
+          <a:p>
+            <a:r>
+              <a:rPr lang="en-US" altLang="zh-CN" dirty="0"/>
+              <a:t>Idle nodes: 4,</a:t>
+            </a:r>
+          </a:p>
+          <a:p>
+            <a:r>
+              <a:rPr lang="en-US" altLang="zh-CN" dirty="0"/>
+              <a:t>Request: null,</a:t>
+            </a:r>
+          </a:p>
+          <a:p>
+            <a:r>
+              <a:rPr lang="en-US" altLang="zh-CN" dirty="0"/>
+              <a:t>Release: ”success”</a:t>
+            </a:r>
+          </a:p>
+          <a:p>
+            <a:r>
+              <a:rPr lang="en-US" altLang="zh-CN" dirty="0"/>
+              <a:t>}</a:t>
+            </a:r>
+            <a:endParaRPr lang="en-US" dirty="0"/>
+          </a:p>
+        </p:txBody>
+      </p:sp>
+      <p:cxnSp>
+        <p:nvCxnSpPr>
+          <p:cNvPr id="11" name="直接箭头连接符 10">
+            <a:extLst>
+              <a:ext uri="{FF2B5EF4-FFF2-40B4-BE49-F238E27FC236}">
+                <a16:creationId xmlns:a16="http://schemas.microsoft.com/office/drawing/2014/main" id="{153FA7CD-5B18-4466-99C1-C973C3EB77B3}"/>
+              </a:ext>
+            </a:extLst>
+          </p:cNvPr>
+          <p:cNvCxnSpPr/>
+          <p:nvPr/>
+        </p:nvCxnSpPr>
+        <p:spPr>
+          <a:xfrm flipH="1">
+            <a:off x="2396971" y="3204839"/>
+            <a:ext cx="1722267" cy="0"/>
+          </a:xfrm>
+          <a:prstGeom prst="straightConnector1">
+            <a:avLst/>
+          </a:prstGeom>
+          <a:ln>
+            <a:tailEnd type="triangle"/>
+          </a:ln>
+        </p:spPr>
+        <p:style>
+          <a:lnRef idx="1">
+            <a:schemeClr val="accent1"/>
+          </a:lnRef>
+          <a:fillRef idx="0">
+            <a:schemeClr val="accent1"/>
+          </a:fillRef>
+          <a:effectRef idx="0">
+            <a:schemeClr val="accent1"/>
+          </a:effectRef>
+          <a:fontRef idx="minor">
+            <a:schemeClr val="tx1"/>
+          </a:fontRef>
+        </p:style>
+      </p:cxnSp>
+      <p:sp>
+        <p:nvSpPr>
+          <p:cNvPr id="12" name="文本框 11">
+            <a:extLst>
+              <a:ext uri="{FF2B5EF4-FFF2-40B4-BE49-F238E27FC236}">
+                <a16:creationId xmlns:a16="http://schemas.microsoft.com/office/drawing/2014/main" id="{81384E3E-E981-4207-A68B-9A2842189565}"/>
+              </a:ext>
+            </a:extLst>
+          </p:cNvPr>
+          <p:cNvSpPr txBox="1"/>
+          <p:nvPr/>
+        </p:nvSpPr>
+        <p:spPr>
+          <a:xfrm>
+            <a:off x="2188345" y="3468495"/>
+            <a:ext cx="2041864" cy="646331"/>
+          </a:xfrm>
+          <a:prstGeom prst="rect">
+            <a:avLst/>
+          </a:prstGeom>
+          <a:noFill/>
+        </p:spPr>
+        <p:txBody>
+          <a:bodyPr wrap="square" rtlCol="0">
+            <a:spAutoFit/>
+          </a:bodyPr>
+          <a:lstStyle/>
+          <a:p>
+            <a:r>
+              <a:rPr lang="en-US" dirty="0"/>
+              <a:t>{Release: “node33”,</a:t>
+            </a:r>
+          </a:p>
+          <a:p>
+            <a:r>
+              <a:rPr lang="en-US" dirty="0"/>
+              <a:t>Request: null} </a:t>
+            </a:r>
+          </a:p>
+        </p:txBody>
+      </p:sp>
+      <p:sp>
+        <p:nvSpPr>
+          <p:cNvPr id="15" name="矩形: 圆角 14">
+            <a:extLst>
+              <a:ext uri="{FF2B5EF4-FFF2-40B4-BE49-F238E27FC236}">
+                <a16:creationId xmlns:a16="http://schemas.microsoft.com/office/drawing/2014/main" id="{D5CC5F6B-1D1C-4C2D-A087-069010C116A5}"/>
+              </a:ext>
+            </a:extLst>
+          </p:cNvPr>
+          <p:cNvSpPr/>
+          <p:nvPr/>
+        </p:nvSpPr>
+        <p:spPr>
+          <a:xfrm>
+            <a:off x="2299317" y="5261387"/>
+            <a:ext cx="2646287" cy="1178170"/>
+          </a:xfrm>
+          <a:prstGeom prst="roundRect">
+            <a:avLst/>
+          </a:prstGeom>
+          <a:solidFill>
+            <a:schemeClr val="accent6">
+              <a:lumMod val="40000"/>
+              <a:lumOff val="60000"/>
+            </a:schemeClr>
+          </a:solidFill>
+        </p:spPr>
+        <p:style>
+          <a:lnRef idx="2">
+            <a:schemeClr val="accent1">
+              <a:shade val="50000"/>
+            </a:schemeClr>
+          </a:lnRef>
+          <a:fillRef idx="1">
+            <a:schemeClr val="accent1"/>
+          </a:fillRef>
+          <a:effectRef idx="0">
+            <a:schemeClr val="accent1"/>
+          </a:effectRef>
+          <a:fontRef idx="minor">
+            <a:schemeClr val="lt1"/>
+          </a:fontRef>
+        </p:style>
+        <p:txBody>
+          <a:bodyPr rtlCol="0" anchor="ctr"/>
+          <a:lstStyle/>
+          <a:p>
+            <a:pPr algn="ctr"/>
+            <a:endParaRPr lang="en-US" dirty="0"/>
+          </a:p>
+        </p:txBody>
+      </p:sp>
+      <p:sp>
+        <p:nvSpPr>
+          <p:cNvPr id="16" name="矩形: 圆角 15">
+            <a:extLst>
+              <a:ext uri="{FF2B5EF4-FFF2-40B4-BE49-F238E27FC236}">
+                <a16:creationId xmlns:a16="http://schemas.microsoft.com/office/drawing/2014/main" id="{0D20BE38-9E47-48D1-AD3A-FFA3E3DA32F5}"/>
+              </a:ext>
+            </a:extLst>
+          </p:cNvPr>
+          <p:cNvSpPr/>
+          <p:nvPr/>
+        </p:nvSpPr>
+        <p:spPr>
+          <a:xfrm>
+            <a:off x="8886548" y="5261387"/>
+            <a:ext cx="2646287" cy="1178170"/>
+          </a:xfrm>
+          <a:prstGeom prst="roundRect">
+            <a:avLst/>
+          </a:prstGeom>
+          <a:solidFill>
+            <a:schemeClr val="accent6">
+              <a:lumMod val="40000"/>
+              <a:lumOff val="60000"/>
+            </a:schemeClr>
+          </a:solidFill>
+        </p:spPr>
+        <p:style>
+          <a:lnRef idx="2">
+            <a:schemeClr val="accent1">
+              <a:shade val="50000"/>
+            </a:schemeClr>
+          </a:lnRef>
+          <a:fillRef idx="1">
+            <a:schemeClr val="accent1"/>
+          </a:fillRef>
+          <a:effectRef idx="0">
+            <a:schemeClr val="accent1"/>
+          </a:effectRef>
+          <a:fontRef idx="minor">
+            <a:schemeClr val="lt1"/>
+          </a:fontRef>
+        </p:style>
+        <p:txBody>
+          <a:bodyPr rtlCol="0" anchor="ctr"/>
+          <a:lstStyle/>
+          <a:p>
+            <a:pPr algn="ctr"/>
+            <a:endParaRPr lang="en-US" dirty="0"/>
+          </a:p>
+        </p:txBody>
+      </p:sp>
+      <p:sp>
+        <p:nvSpPr>
+          <p:cNvPr id="17" name="矩形: 圆角 16">
+            <a:extLst>
+              <a:ext uri="{FF2B5EF4-FFF2-40B4-BE49-F238E27FC236}">
+                <a16:creationId xmlns:a16="http://schemas.microsoft.com/office/drawing/2014/main" id="{B997AAA6-F055-447A-A209-FB98E69BE93A}"/>
+              </a:ext>
+            </a:extLst>
+          </p:cNvPr>
+          <p:cNvSpPr/>
+          <p:nvPr/>
+        </p:nvSpPr>
+        <p:spPr>
+          <a:xfrm>
+            <a:off x="5684669" y="5312229"/>
+            <a:ext cx="2646287" cy="1178170"/>
+          </a:xfrm>
+          <a:prstGeom prst="roundRect">
+            <a:avLst/>
+          </a:prstGeom>
+          <a:solidFill>
+            <a:schemeClr val="accent6">
+              <a:lumMod val="40000"/>
+              <a:lumOff val="60000"/>
+            </a:schemeClr>
+          </a:solidFill>
+        </p:spPr>
+        <p:style>
+          <a:lnRef idx="2">
+            <a:schemeClr val="accent1">
+              <a:shade val="50000"/>
+            </a:schemeClr>
+          </a:lnRef>
+          <a:fillRef idx="1">
+            <a:schemeClr val="accent1"/>
+          </a:fillRef>
+          <a:effectRef idx="0">
+            <a:schemeClr val="accent1"/>
+          </a:effectRef>
+          <a:fontRef idx="minor">
+            <a:schemeClr val="lt1"/>
+          </a:fontRef>
+        </p:style>
+        <p:txBody>
+          <a:bodyPr rtlCol="0" anchor="ctr"/>
+          <a:lstStyle/>
+          <a:p>
+            <a:pPr algn="ctr"/>
+            <a:endParaRPr lang="en-US" dirty="0"/>
+          </a:p>
+        </p:txBody>
+      </p:sp>
+      <p:cxnSp>
+        <p:nvCxnSpPr>
+          <p:cNvPr id="19" name="连接符: 肘形 18">
+            <a:extLst>
+              <a:ext uri="{FF2B5EF4-FFF2-40B4-BE49-F238E27FC236}">
+                <a16:creationId xmlns:a16="http://schemas.microsoft.com/office/drawing/2014/main" id="{AC6DF712-54E6-4805-95C1-AF8FAD34FDF9}"/>
+              </a:ext>
+            </a:extLst>
+          </p:cNvPr>
+          <p:cNvCxnSpPr>
+            <a:stCxn id="5" idx="2"/>
+            <a:endCxn id="15" idx="1"/>
+          </p:cNvCxnSpPr>
+          <p:nvPr/>
+        </p:nvCxnSpPr>
+        <p:spPr>
+          <a:xfrm rot="16200000" flipH="1">
+            <a:off x="594760" y="4145914"/>
+            <a:ext cx="2263895" cy="1145220"/>
+          </a:xfrm>
+          <a:prstGeom prst="bentConnector2">
+            <a:avLst/>
+          </a:prstGeom>
+          <a:ln>
+            <a:tailEnd type="triangle"/>
+          </a:ln>
+        </p:spPr>
+        <p:style>
+          <a:lnRef idx="1">
+            <a:schemeClr val="accent1"/>
+          </a:lnRef>
+          <a:fillRef idx="0">
+            <a:schemeClr val="accent1"/>
+          </a:fillRef>
+          <a:effectRef idx="0">
+            <a:schemeClr val="accent1"/>
+          </a:effectRef>
+          <a:fontRef idx="minor">
+            <a:schemeClr val="tx1"/>
+          </a:fontRef>
+        </p:style>
+      </p:cxnSp>
+      <p:sp>
+        <p:nvSpPr>
+          <p:cNvPr id="20" name="文本框 19">
+            <a:extLst>
+              <a:ext uri="{FF2B5EF4-FFF2-40B4-BE49-F238E27FC236}">
+                <a16:creationId xmlns:a16="http://schemas.microsoft.com/office/drawing/2014/main" id="{F5253F0C-F5E1-4E34-807B-16B38A3B14AD}"/>
+              </a:ext>
+            </a:extLst>
+          </p:cNvPr>
+          <p:cNvSpPr txBox="1"/>
+          <p:nvPr/>
+        </p:nvSpPr>
+        <p:spPr>
+          <a:xfrm>
+            <a:off x="1242874" y="4607511"/>
+            <a:ext cx="1313895" cy="375136"/>
+          </a:xfrm>
+          <a:prstGeom prst="rect">
+            <a:avLst/>
+          </a:prstGeom>
+          <a:noFill/>
+        </p:spPr>
+        <p:txBody>
+          <a:bodyPr wrap="square" rtlCol="0">
+            <a:spAutoFit/>
+          </a:bodyPr>
+          <a:lstStyle/>
+          <a:p>
+            <a:r>
+              <a:rPr lang="en-US" dirty="0"/>
+              <a:t>Release</a:t>
+            </a:r>
+          </a:p>
+        </p:txBody>
+      </p:sp>
+    </p:spTree>
+    <p:extLst>
+      <p:ext uri="{BB962C8B-B14F-4D97-AF65-F5344CB8AC3E}">
+        <p14:creationId xmlns:p14="http://schemas.microsoft.com/office/powerpoint/2010/main" val="2862734688"/>
+      </p:ext>
+    </p:extLst>
+  </p:cSld>
+  <p:clrMapOvr>
+    <a:masterClrMapping/>
+  </p:clrMapOvr>
+</p:sld>
+</file>
+
+<file path=ppt/slides/slide7.xml><?xml version="1.0" encoding="utf-8"?>
+<p:sld xmlns:a="http://schemas.openxmlformats.org/drawingml/2006/main" xmlns:r="http://schemas.openxmlformats.org/officeDocument/2006/relationships" xmlns:p="http://schemas.openxmlformats.org/presentationml/2006/main">
+  <p:cSld>
+    <p:spTree>
+      <p:nvGrpSpPr>
+        <p:cNvPr id="1" name=""/>
+        <p:cNvGrpSpPr/>
+        <p:nvPr/>
+      </p:nvGrpSpPr>
+      <p:grpSpPr>
+        <a:xfrm>
+          <a:off x="0" y="0"/>
+          <a:ext cx="0" cy="0"/>
+          <a:chOff x="0" y="0"/>
+          <a:chExt cx="0" cy="0"/>
+        </a:xfrm>
+      </p:grpSpPr>
+      <p:sp>
+        <p:nvSpPr>
+          <p:cNvPr id="2" name="标题 1">
+            <a:extLst>
+              <a:ext uri="{FF2B5EF4-FFF2-40B4-BE49-F238E27FC236}">
+                <a16:creationId xmlns:a16="http://schemas.microsoft.com/office/drawing/2014/main" id="{497E0A81-0BD6-4F7C-88D0-742D39B2BF49}"/>
+              </a:ext>
+            </a:extLst>
+          </p:cNvPr>
+          <p:cNvSpPr>
+            <a:spLocks noGrp="1"/>
+          </p:cNvSpPr>
+          <p:nvPr>
+            <p:ph type="title"/>
+          </p:nvPr>
+        </p:nvSpPr>
+        <p:spPr/>
+        <p:txBody>
+          <a:bodyPr/>
+          <a:lstStyle/>
+          <a:p>
+            <a:r>
+              <a:rPr lang="en-US" dirty="0"/>
+              <a:t>Cross region &amp; Data locality</a:t>
+            </a:r>
+          </a:p>
+        </p:txBody>
+      </p:sp>
+      <p:pic>
+        <p:nvPicPr>
+          <p:cNvPr id="5" name="图片 4" descr="电子产品的特写&#10;&#10;描述已自动生成">
+            <a:extLst>
+              <a:ext uri="{FF2B5EF4-FFF2-40B4-BE49-F238E27FC236}">
+                <a16:creationId xmlns:a16="http://schemas.microsoft.com/office/drawing/2014/main" id="{7CC893B0-DBB4-4E67-8F51-D224BF923E76}"/>
+              </a:ext>
+            </a:extLst>
+          </p:cNvPr>
+          <p:cNvPicPr>
+            <a:picLocks noChangeAspect="1"/>
+          </p:cNvPicPr>
+          <p:nvPr/>
+        </p:nvPicPr>
+        <p:blipFill>
+          <a:blip r:embed="rId2">
+            <a:extLst>
+              <a:ext uri="{28A0092B-C50C-407E-A947-70E740481C1C}">
+                <a14:useLocalDpi xmlns:a14="http://schemas.microsoft.com/office/drawing/2010/main" val="0"/>
+              </a:ext>
+            </a:extLst>
+          </a:blip>
+          <a:stretch>
+            <a:fillRect/>
+          </a:stretch>
+        </p:blipFill>
+        <p:spPr>
+          <a:xfrm>
+            <a:off x="4698024" y="1465073"/>
+            <a:ext cx="6871935" cy="5103677"/>
+          </a:xfrm>
+          <a:prstGeom prst="rect">
+            <a:avLst/>
+          </a:prstGeom>
+        </p:spPr>
+      </p:pic>
+      <p:sp>
+        <p:nvSpPr>
+          <p:cNvPr id="6" name="文本框 5">
+            <a:extLst>
+              <a:ext uri="{FF2B5EF4-FFF2-40B4-BE49-F238E27FC236}">
+                <a16:creationId xmlns:a16="http://schemas.microsoft.com/office/drawing/2014/main" id="{5D46EEBF-44FD-470B-B069-20546C9DDB4A}"/>
+              </a:ext>
+            </a:extLst>
+          </p:cNvPr>
+          <p:cNvSpPr txBox="1"/>
+          <p:nvPr/>
+        </p:nvSpPr>
+        <p:spPr>
+          <a:xfrm>
+            <a:off x="622041" y="2230017"/>
+            <a:ext cx="3965512" cy="1200329"/>
+          </a:xfrm>
+          <a:prstGeom prst="rect">
+            <a:avLst/>
+          </a:prstGeom>
+          <a:noFill/>
+        </p:spPr>
+        <p:txBody>
+          <a:bodyPr wrap="square" rtlCol="0">
+            <a:spAutoFit/>
+          </a:bodyPr>
+          <a:lstStyle/>
+          <a:p>
+            <a:pPr marL="285750" indent="-285750">
+              <a:buFont typeface="Arial" panose="020B0604020202020204" pitchFamily="34" charset="0"/>
+              <a:buChar char="•"/>
+            </a:pPr>
+            <a:r>
+              <a:rPr lang="en-US" dirty="0"/>
+              <a:t>Utilizing remote resources</a:t>
+            </a:r>
+          </a:p>
+          <a:p>
+            <a:pPr marL="285750" indent="-285750">
+              <a:buFont typeface="Arial" panose="020B0604020202020204" pitchFamily="34" charset="0"/>
+              <a:buChar char="•"/>
+            </a:pPr>
+            <a:r>
+              <a:rPr lang="en-US" dirty="0"/>
+              <a:t>Backup to each other</a:t>
+            </a:r>
+          </a:p>
+          <a:p>
+            <a:pPr marL="285750" indent="-285750">
+              <a:buFont typeface="Arial" panose="020B0604020202020204" pitchFamily="34" charset="0"/>
+              <a:buChar char="•"/>
+            </a:pPr>
+            <a:r>
+              <a:rPr lang="en-US" dirty="0"/>
+              <a:t>Submit anywhere, run at close place</a:t>
+            </a:r>
+          </a:p>
+          <a:p>
+            <a:pPr marL="285750" indent="-285750">
+              <a:buFont typeface="Arial" panose="020B0604020202020204" pitchFamily="34" charset="0"/>
+              <a:buChar char="•"/>
+            </a:pPr>
+            <a:r>
+              <a:rPr lang="en-US" dirty="0"/>
+              <a:t>Staging and processing at same time</a:t>
+            </a:r>
+          </a:p>
+        </p:txBody>
+      </p:sp>
+    </p:spTree>
+    <p:extLst>
+      <p:ext uri="{BB962C8B-B14F-4D97-AF65-F5344CB8AC3E}">
+        <p14:creationId xmlns:p14="http://schemas.microsoft.com/office/powerpoint/2010/main" val="976536199"/>
+      </p:ext>
+    </p:extLst>
+  </p:cSld>
+  <p:clrMapOvr>
+    <a:masterClrMapping/>
+  </p:clrMapOvr>
+</p:sld>
+</file>
+
+<file path=ppt/slides/slide8.xml><?xml version="1.0" encoding="utf-8"?>
+<p:sld xmlns:a="http://schemas.openxmlformats.org/drawingml/2006/main" xmlns:r="http://schemas.openxmlformats.org/officeDocument/2006/relationships" xmlns:p="http://schemas.openxmlformats.org/presentationml/2006/main">
+  <p:cSld>
+    <p:spTree>
+      <p:nvGrpSpPr>
+        <p:cNvPr id="1" name=""/>
+        <p:cNvGrpSpPr/>
+        <p:nvPr/>
+      </p:nvGrpSpPr>
+      <p:grpSpPr>
+        <a:xfrm>
+          <a:off x="0" y="0"/>
+          <a:ext cx="0" cy="0"/>
+          <a:chOff x="0" y="0"/>
+          <a:chExt cx="0" cy="0"/>
+        </a:xfrm>
+      </p:grpSpPr>
+      <p:sp>
+        <p:nvSpPr>
+          <p:cNvPr id="2" name="标题 1">
+            <a:extLst>
+              <a:ext uri="{FF2B5EF4-FFF2-40B4-BE49-F238E27FC236}">
+                <a16:creationId xmlns:a16="http://schemas.microsoft.com/office/drawing/2014/main" id="{9568D9EF-0904-47D6-815E-755D6AA85457}"/>
+              </a:ext>
+            </a:extLst>
+          </p:cNvPr>
+          <p:cNvSpPr>
+            <a:spLocks noGrp="1"/>
+          </p:cNvSpPr>
+          <p:nvPr>
+            <p:ph type="title"/>
+          </p:nvPr>
+        </p:nvSpPr>
+        <p:spPr/>
+        <p:txBody>
+          <a:bodyPr/>
+          <a:lstStyle/>
+          <a:p>
+            <a:r>
+              <a:rPr lang="en-US" dirty="0"/>
+              <a:t>Stages plan</a:t>
+            </a:r>
+          </a:p>
+        </p:txBody>
+      </p:sp>
+      <p:sp>
+        <p:nvSpPr>
+          <p:cNvPr id="3" name="内容占位符 2">
+            <a:extLst>
+              <a:ext uri="{FF2B5EF4-FFF2-40B4-BE49-F238E27FC236}">
+                <a16:creationId xmlns:a16="http://schemas.microsoft.com/office/drawing/2014/main" id="{A0A4A398-15FB-4307-9619-C0691EB662C5}"/>
+              </a:ext>
+            </a:extLst>
+          </p:cNvPr>
+          <p:cNvSpPr>
+            <a:spLocks noGrp="1"/>
+          </p:cNvSpPr>
+          <p:nvPr>
+            <p:ph idx="1"/>
+          </p:nvPr>
+        </p:nvSpPr>
+        <p:spPr/>
+        <p:txBody>
+          <a:bodyPr/>
+          <a:lstStyle/>
+          <a:p>
+            <a:pPr marL="0" indent="0">
+              <a:buNone/>
+            </a:pPr>
+            <a:r>
+              <a:rPr lang="en-US" dirty="0"/>
+              <a:t>Phase 1: Ibis +</a:t>
+            </a:r>
+            <a:r>
+              <a:rPr lang="en-US" dirty="0" err="1"/>
+              <a:t>Sagecal</a:t>
+            </a:r>
+            <a:r>
+              <a:rPr lang="en-US" dirty="0"/>
+              <a:t> with docker container on one node</a:t>
+            </a:r>
+          </a:p>
+          <a:p>
+            <a:pPr marL="0" indent="0">
+              <a:buNone/>
+            </a:pPr>
+            <a:r>
+              <a:rPr lang="en-US" dirty="0"/>
+              <a:t>Phase 2: resource management at one cluster(multiple nodes)</a:t>
+            </a:r>
+          </a:p>
+          <a:p>
+            <a:pPr marL="0" indent="0">
+              <a:buNone/>
+            </a:pPr>
+            <a:r>
+              <a:rPr lang="en-US" dirty="0"/>
+              <a:t>Phase 3: cross-region</a:t>
+            </a:r>
+          </a:p>
+          <a:p>
+            <a:pPr marL="0" indent="0">
+              <a:buNone/>
+            </a:pPr>
+            <a:r>
+              <a:rPr lang="en-US" dirty="0"/>
+              <a:t>Extra 1: parallelize staging from tape </a:t>
+            </a:r>
+            <a:r>
+              <a:rPr lang="en-US"/>
+              <a:t>and processing</a:t>
+            </a:r>
+            <a:endParaRPr lang="en-US" dirty="0"/>
+          </a:p>
+        </p:txBody>
+      </p:sp>
+    </p:spTree>
+    <p:extLst>
+      <p:ext uri="{BB962C8B-B14F-4D97-AF65-F5344CB8AC3E}">
+        <p14:creationId xmlns:p14="http://schemas.microsoft.com/office/powerpoint/2010/main" val="1751667671"/>
       </p:ext>
     </p:extLst>
   </p:cSld>

</xml_diff>